<commit_message>
PWRPT avec qq images
PWRPT avec qq images
</commit_message>
<xml_diff>
--- a/Présentation_Rucher.pptx
+++ b/Présentation_Rucher.pptx
@@ -8932,31 +8932,6 @@
       </p:sp>
       <p:sp>
         <p:nvSpPr>
-          <p:cNvPr id="3" name="Espace réservé du contenu 2">
-            <a:extLst>
-              <a:ext uri="{FF2B5EF4-FFF2-40B4-BE49-F238E27FC236}">
-                <a16:creationId xmlns:a16="http://schemas.microsoft.com/office/drawing/2014/main" id="{479A497B-F4F0-465E-9FB2-2B4F1344AD8C}"/>
-              </a:ext>
-            </a:extLst>
-          </p:cNvPr>
-          <p:cNvSpPr>
-            <a:spLocks noGrp="1"/>
-          </p:cNvSpPr>
-          <p:nvPr>
-            <p:ph idx="1"/>
-          </p:nvPr>
-        </p:nvSpPr>
-        <p:spPr/>
-        <p:txBody>
-          <a:bodyPr/>
-          <a:lstStyle/>
-          <a:p>
-            <a:endParaRPr lang="fr-FR"/>
-          </a:p>
-        </p:txBody>
-      </p:sp>
-      <p:sp>
-        <p:nvSpPr>
           <p:cNvPr id="4" name="Espace réservé du numéro de diapositive 3">
             <a:extLst>
               <a:ext uri="{FF2B5EF4-FFF2-40B4-BE49-F238E27FC236}">
@@ -8984,6 +8959,36 @@
           </a:p>
         </p:txBody>
       </p:sp>
+      <p:pic>
+        <p:nvPicPr>
+          <p:cNvPr id="5" name="Image 4">
+            <a:extLst>
+              <a:ext uri="{FF2B5EF4-FFF2-40B4-BE49-F238E27FC236}">
+                <a16:creationId xmlns:a16="http://schemas.microsoft.com/office/drawing/2014/main" id="{99C06DAE-F853-4DA0-A08B-04FB9070A818}"/>
+              </a:ext>
+            </a:extLst>
+          </p:cNvPr>
+          <p:cNvPicPr>
+            <a:picLocks noChangeAspect="1"/>
+          </p:cNvPicPr>
+          <p:nvPr/>
+        </p:nvPicPr>
+        <p:blipFill>
+          <a:blip r:embed="rId2"/>
+          <a:stretch>
+            <a:fillRect/>
+          </a:stretch>
+        </p:blipFill>
+        <p:spPr>
+          <a:xfrm>
+            <a:off x="815381" y="731521"/>
+            <a:ext cx="5334662" cy="3769743"/>
+          </a:xfrm>
+          <a:prstGeom prst="rect">
+            <a:avLst/>
+          </a:prstGeom>
+        </p:spPr>
+      </p:pic>
     </p:spTree>
     <p:extLst>
       <p:ext uri="{BB962C8B-B14F-4D97-AF65-F5344CB8AC3E}">
@@ -9480,6 +9485,55 @@
           <a:chExt cx="0" cy="0"/>
         </a:xfrm>
       </p:grpSpPr>
+      <p:cxnSp>
+        <p:nvCxnSpPr>
+          <p:cNvPr id="31" name="Connecteur : en angle 30">
+            <a:extLst>
+              <a:ext uri="{FF2B5EF4-FFF2-40B4-BE49-F238E27FC236}">
+                <a16:creationId xmlns:a16="http://schemas.microsoft.com/office/drawing/2014/main" id="{0F1B7BDD-053F-4374-AD04-1299C089FAD1}"/>
+              </a:ext>
+            </a:extLst>
+          </p:cNvPr>
+          <p:cNvCxnSpPr>
+            <a:cxnSpLocks/>
+            <a:stCxn id="8" idx="0"/>
+            <a:endCxn id="25" idx="1"/>
+          </p:cNvCxnSpPr>
+          <p:nvPr/>
+        </p:nvCxnSpPr>
+        <p:spPr>
+          <a:xfrm rot="5400000" flipH="1" flipV="1">
+            <a:off x="7023983" y="2279980"/>
+            <a:ext cx="852130" cy="3424039"/>
+          </a:xfrm>
+          <a:prstGeom prst="bentConnector2">
+            <a:avLst/>
+          </a:prstGeom>
+          <a:ln w="38100">
+            <a:solidFill>
+              <a:schemeClr val="tx2">
+                <a:lumMod val="50000"/>
+                <a:lumOff val="50000"/>
+              </a:schemeClr>
+            </a:solidFill>
+            <a:tailEnd type="triangle"/>
+          </a:ln>
+        </p:spPr>
+        <p:style>
+          <a:lnRef idx="1">
+            <a:schemeClr val="accent1"/>
+          </a:lnRef>
+          <a:fillRef idx="0">
+            <a:schemeClr val="accent1"/>
+          </a:fillRef>
+          <a:effectRef idx="0">
+            <a:schemeClr val="accent1"/>
+          </a:effectRef>
+          <a:fontRef idx="minor">
+            <a:schemeClr val="tx1"/>
+          </a:fontRef>
+        </p:style>
+      </p:cxnSp>
       <p:sp>
         <p:nvSpPr>
           <p:cNvPr id="2" name="Titre 1">
@@ -9542,6 +9596,370 @@
           </a:p>
         </p:txBody>
       </p:sp>
+      <p:pic>
+        <p:nvPicPr>
+          <p:cNvPr id="8" name="Image 7">
+            <a:extLst>
+              <a:ext uri="{FF2B5EF4-FFF2-40B4-BE49-F238E27FC236}">
+                <a16:creationId xmlns:a16="http://schemas.microsoft.com/office/drawing/2014/main" id="{F0E9977D-31E3-4C93-9562-1D4CDD6A1C42}"/>
+              </a:ext>
+            </a:extLst>
+          </p:cNvPr>
+          <p:cNvPicPr>
+            <a:picLocks noChangeAspect="1"/>
+          </p:cNvPicPr>
+          <p:nvPr/>
+        </p:nvPicPr>
+        <p:blipFill rotWithShape="1">
+          <a:blip r:embed="rId2"/>
+          <a:srcRect l="20179" r="16213" b="15975"/>
+          <a:stretch/>
+        </p:blipFill>
+        <p:spPr>
+          <a:xfrm>
+            <a:off x="5002992" y="4418064"/>
+            <a:ext cx="1470074" cy="1941921"/>
+          </a:xfrm>
+          <a:prstGeom prst="rect">
+            <a:avLst/>
+          </a:prstGeom>
+        </p:spPr>
+      </p:pic>
+      <p:pic>
+        <p:nvPicPr>
+          <p:cNvPr id="14" name="Image 13">
+            <a:extLst>
+              <a:ext uri="{FF2B5EF4-FFF2-40B4-BE49-F238E27FC236}">
+                <a16:creationId xmlns:a16="http://schemas.microsoft.com/office/drawing/2014/main" id="{0AA329D8-3397-4510-A5E9-3E4E2A8000A4}"/>
+              </a:ext>
+            </a:extLst>
+          </p:cNvPr>
+          <p:cNvPicPr>
+            <a:picLocks noChangeAspect="1"/>
+          </p:cNvPicPr>
+          <p:nvPr/>
+        </p:nvPicPr>
+        <p:blipFill rotWithShape="1">
+          <a:blip r:embed="rId3"/>
+          <a:srcRect r="1259" b="14667"/>
+          <a:stretch/>
+        </p:blipFill>
+        <p:spPr>
+          <a:xfrm>
+            <a:off x="6828099" y="4320636"/>
+            <a:ext cx="1254411" cy="1084082"/>
+          </a:xfrm>
+          <a:prstGeom prst="rect">
+            <a:avLst/>
+          </a:prstGeom>
+        </p:spPr>
+      </p:pic>
+      <p:pic>
+        <p:nvPicPr>
+          <p:cNvPr id="16" name="Image 15">
+            <a:extLst>
+              <a:ext uri="{FF2B5EF4-FFF2-40B4-BE49-F238E27FC236}">
+                <a16:creationId xmlns:a16="http://schemas.microsoft.com/office/drawing/2014/main" id="{3D27CD60-12C4-45EF-B155-914C508B9FDA}"/>
+              </a:ext>
+            </a:extLst>
+          </p:cNvPr>
+          <p:cNvPicPr>
+            <a:picLocks noChangeAspect="1"/>
+          </p:cNvPicPr>
+          <p:nvPr/>
+        </p:nvPicPr>
+        <p:blipFill rotWithShape="1">
+          <a:blip r:embed="rId4"/>
+          <a:srcRect r="3482" b="18519"/>
+          <a:stretch/>
+        </p:blipFill>
+        <p:spPr>
+          <a:xfrm>
+            <a:off x="4843791" y="1670608"/>
+            <a:ext cx="1317645" cy="1112363"/>
+          </a:xfrm>
+          <a:prstGeom prst="rect">
+            <a:avLst/>
+          </a:prstGeom>
+        </p:spPr>
+      </p:pic>
+      <p:pic>
+        <p:nvPicPr>
+          <p:cNvPr id="18" name="Image 17">
+            <a:extLst>
+              <a:ext uri="{FF2B5EF4-FFF2-40B4-BE49-F238E27FC236}">
+                <a16:creationId xmlns:a16="http://schemas.microsoft.com/office/drawing/2014/main" id="{690785FF-AB6B-4F7E-AAF0-B52C6C29D105}"/>
+              </a:ext>
+            </a:extLst>
+          </p:cNvPr>
+          <p:cNvPicPr>
+            <a:picLocks noChangeAspect="1"/>
+          </p:cNvPicPr>
+          <p:nvPr/>
+        </p:nvPicPr>
+        <p:blipFill rotWithShape="1">
+          <a:blip r:embed="rId5"/>
+          <a:srcRect r="667" b="20296"/>
+          <a:stretch/>
+        </p:blipFill>
+        <p:spPr>
+          <a:xfrm>
+            <a:off x="2895777" y="3243898"/>
+            <a:ext cx="998619" cy="801278"/>
+          </a:xfrm>
+          <a:prstGeom prst="rect">
+            <a:avLst/>
+          </a:prstGeom>
+        </p:spPr>
+      </p:pic>
+      <p:pic>
+        <p:nvPicPr>
+          <p:cNvPr id="20" name="Image 19">
+            <a:extLst>
+              <a:ext uri="{FF2B5EF4-FFF2-40B4-BE49-F238E27FC236}">
+                <a16:creationId xmlns:a16="http://schemas.microsoft.com/office/drawing/2014/main" id="{718E0BF8-ACBA-4BBB-9BE5-337E4252DAF2}"/>
+              </a:ext>
+            </a:extLst>
+          </p:cNvPr>
+          <p:cNvPicPr>
+            <a:picLocks noChangeAspect="1"/>
+          </p:cNvPicPr>
+          <p:nvPr/>
+        </p:nvPicPr>
+        <p:blipFill rotWithShape="1">
+          <a:blip r:embed="rId6"/>
+          <a:srcRect r="1259" b="13481"/>
+          <a:stretch/>
+        </p:blipFill>
+        <p:spPr>
+          <a:xfrm>
+            <a:off x="1345140" y="3131854"/>
+            <a:ext cx="1170217" cy="1025366"/>
+          </a:xfrm>
+          <a:prstGeom prst="rect">
+            <a:avLst/>
+          </a:prstGeom>
+        </p:spPr>
+      </p:pic>
+      <p:pic>
+        <p:nvPicPr>
+          <p:cNvPr id="25" name="Image 24">
+            <a:extLst>
+              <a:ext uri="{FF2B5EF4-FFF2-40B4-BE49-F238E27FC236}">
+                <a16:creationId xmlns:a16="http://schemas.microsoft.com/office/drawing/2014/main" id="{807794CC-FE6D-4EFE-9F0F-AE610A88751F}"/>
+              </a:ext>
+            </a:extLst>
+          </p:cNvPr>
+          <p:cNvPicPr>
+            <a:picLocks noChangeAspect="1"/>
+          </p:cNvPicPr>
+          <p:nvPr/>
+        </p:nvPicPr>
+        <p:blipFill rotWithShape="1">
+          <a:blip r:embed="rId7"/>
+          <a:srcRect r="2000" b="14667"/>
+          <a:stretch/>
+        </p:blipFill>
+        <p:spPr>
+          <a:xfrm>
+            <a:off x="9162068" y="2934785"/>
+            <a:ext cx="1449669" cy="1262297"/>
+          </a:xfrm>
+          <a:prstGeom prst="rect">
+            <a:avLst/>
+          </a:prstGeom>
+        </p:spPr>
+      </p:pic>
+      <p:cxnSp>
+        <p:nvCxnSpPr>
+          <p:cNvPr id="42" name="Connecteur : en angle 41">
+            <a:extLst>
+              <a:ext uri="{FF2B5EF4-FFF2-40B4-BE49-F238E27FC236}">
+                <a16:creationId xmlns:a16="http://schemas.microsoft.com/office/drawing/2014/main" id="{D4EF49BE-28CB-45E1-906E-169AF658060C}"/>
+              </a:ext>
+            </a:extLst>
+          </p:cNvPr>
+          <p:cNvCxnSpPr>
+            <a:cxnSpLocks/>
+            <a:stCxn id="16" idx="3"/>
+            <a:endCxn id="25" idx="1"/>
+          </p:cNvCxnSpPr>
+          <p:nvPr/>
+        </p:nvCxnSpPr>
+        <p:spPr>
+          <a:xfrm>
+            <a:off x="6161436" y="2226790"/>
+            <a:ext cx="3000632" cy="1339144"/>
+          </a:xfrm>
+          <a:prstGeom prst="bentConnector3">
+            <a:avLst>
+              <a:gd name="adj1" fmla="val 50000"/>
+            </a:avLst>
+          </a:prstGeom>
+          <a:ln w="38100">
+            <a:solidFill>
+              <a:schemeClr val="tx2">
+                <a:lumMod val="50000"/>
+                <a:lumOff val="50000"/>
+              </a:schemeClr>
+            </a:solidFill>
+            <a:tailEnd type="triangle"/>
+          </a:ln>
+        </p:spPr>
+        <p:style>
+          <a:lnRef idx="1">
+            <a:schemeClr val="accent1"/>
+          </a:lnRef>
+          <a:fillRef idx="0">
+            <a:schemeClr val="accent1"/>
+          </a:fillRef>
+          <a:effectRef idx="0">
+            <a:schemeClr val="accent1"/>
+          </a:effectRef>
+          <a:fontRef idx="minor">
+            <a:schemeClr val="tx1"/>
+          </a:fontRef>
+        </p:style>
+      </p:cxnSp>
+      <p:cxnSp>
+        <p:nvCxnSpPr>
+          <p:cNvPr id="46" name="Connecteur droit 45">
+            <a:extLst>
+              <a:ext uri="{FF2B5EF4-FFF2-40B4-BE49-F238E27FC236}">
+                <a16:creationId xmlns:a16="http://schemas.microsoft.com/office/drawing/2014/main" id="{CE401A91-8B9D-4428-880E-BC2563435EEB}"/>
+              </a:ext>
+            </a:extLst>
+          </p:cNvPr>
+          <p:cNvCxnSpPr>
+            <a:stCxn id="20" idx="3"/>
+            <a:endCxn id="18" idx="1"/>
+          </p:cNvCxnSpPr>
+          <p:nvPr/>
+        </p:nvCxnSpPr>
+        <p:spPr>
+          <a:xfrm>
+            <a:off x="2515357" y="3644537"/>
+            <a:ext cx="380420" cy="0"/>
+          </a:xfrm>
+          <a:prstGeom prst="line">
+            <a:avLst/>
+          </a:prstGeom>
+          <a:ln w="38100"/>
+        </p:spPr>
+        <p:style>
+          <a:lnRef idx="1">
+            <a:schemeClr val="accent1"/>
+          </a:lnRef>
+          <a:fillRef idx="0">
+            <a:schemeClr val="accent1"/>
+          </a:fillRef>
+          <a:effectRef idx="0">
+            <a:schemeClr val="accent1"/>
+          </a:effectRef>
+          <a:fontRef idx="minor">
+            <a:schemeClr val="tx1"/>
+          </a:fontRef>
+        </p:style>
+      </p:cxnSp>
+      <p:cxnSp>
+        <p:nvCxnSpPr>
+          <p:cNvPr id="47" name="Connecteur : en angle 46">
+            <a:extLst>
+              <a:ext uri="{FF2B5EF4-FFF2-40B4-BE49-F238E27FC236}">
+                <a16:creationId xmlns:a16="http://schemas.microsoft.com/office/drawing/2014/main" id="{07617F77-630F-4308-823A-C88BE98C5FC7}"/>
+              </a:ext>
+            </a:extLst>
+          </p:cNvPr>
+          <p:cNvCxnSpPr>
+            <a:cxnSpLocks/>
+            <a:stCxn id="18" idx="3"/>
+            <a:endCxn id="16" idx="1"/>
+          </p:cNvCxnSpPr>
+          <p:nvPr/>
+        </p:nvCxnSpPr>
+        <p:spPr>
+          <a:xfrm flipV="1">
+            <a:off x="3894396" y="2226790"/>
+            <a:ext cx="949395" cy="1417747"/>
+          </a:xfrm>
+          <a:prstGeom prst="bentConnector3">
+            <a:avLst>
+              <a:gd name="adj1" fmla="val 50000"/>
+            </a:avLst>
+          </a:prstGeom>
+          <a:ln w="38100">
+            <a:solidFill>
+              <a:schemeClr val="tx2">
+                <a:lumMod val="50000"/>
+                <a:lumOff val="50000"/>
+              </a:schemeClr>
+            </a:solidFill>
+            <a:tailEnd type="triangle"/>
+          </a:ln>
+        </p:spPr>
+        <p:style>
+          <a:lnRef idx="1">
+            <a:schemeClr val="accent1"/>
+          </a:lnRef>
+          <a:fillRef idx="0">
+            <a:schemeClr val="accent1"/>
+          </a:fillRef>
+          <a:effectRef idx="0">
+            <a:schemeClr val="accent1"/>
+          </a:effectRef>
+          <a:fontRef idx="minor">
+            <a:schemeClr val="tx1"/>
+          </a:fontRef>
+        </p:style>
+      </p:cxnSp>
+      <p:cxnSp>
+        <p:nvCxnSpPr>
+          <p:cNvPr id="50" name="Connecteur : en angle 49">
+            <a:extLst>
+              <a:ext uri="{FF2B5EF4-FFF2-40B4-BE49-F238E27FC236}">
+                <a16:creationId xmlns:a16="http://schemas.microsoft.com/office/drawing/2014/main" id="{350DBA0E-244E-4B74-A63E-BE3E85D5A9E4}"/>
+              </a:ext>
+            </a:extLst>
+          </p:cNvPr>
+          <p:cNvCxnSpPr>
+            <a:cxnSpLocks/>
+            <a:endCxn id="8" idx="1"/>
+          </p:cNvCxnSpPr>
+          <p:nvPr/>
+        </p:nvCxnSpPr>
+        <p:spPr>
+          <a:xfrm rot="16200000" flipH="1">
+            <a:off x="3650560" y="4036593"/>
+            <a:ext cx="1744486" cy="960378"/>
+          </a:xfrm>
+          <a:prstGeom prst="bentConnector2">
+            <a:avLst/>
+          </a:prstGeom>
+          <a:ln w="38100">
+            <a:solidFill>
+              <a:schemeClr val="tx2">
+                <a:lumMod val="50000"/>
+                <a:lumOff val="50000"/>
+              </a:schemeClr>
+            </a:solidFill>
+            <a:tailEnd type="triangle"/>
+          </a:ln>
+        </p:spPr>
+        <p:style>
+          <a:lnRef idx="1">
+            <a:schemeClr val="accent1"/>
+          </a:lnRef>
+          <a:fillRef idx="0">
+            <a:schemeClr val="accent1"/>
+          </a:fillRef>
+          <a:effectRef idx="0">
+            <a:schemeClr val="accent1"/>
+          </a:effectRef>
+          <a:fontRef idx="minor">
+            <a:schemeClr val="tx1"/>
+          </a:fontRef>
+        </p:style>
+      </p:cxnSp>
     </p:spTree>
     <p:extLst>
       <p:ext uri="{BB962C8B-B14F-4D97-AF65-F5344CB8AC3E}">
@@ -9757,146 +10175,125 @@
           </a:p>
         </p:txBody>
       </p:sp>
-      <p:sp>
-        <p:nvSpPr>
-          <p:cNvPr id="5" name="ZoneTexte 4">
+      <p:pic>
+        <p:nvPicPr>
+          <p:cNvPr id="9" name="Image 8">
             <a:extLst>
               <a:ext uri="{FF2B5EF4-FFF2-40B4-BE49-F238E27FC236}">
-                <a16:creationId xmlns:a16="http://schemas.microsoft.com/office/drawing/2014/main" id="{9B60CA81-63A0-43D0-9AA0-88234CE9E3E3}"/>
+                <a16:creationId xmlns:a16="http://schemas.microsoft.com/office/drawing/2014/main" id="{0A49AAF3-0F1D-4FCC-BB98-6B58326C7A10}"/>
               </a:ext>
             </a:extLst>
           </p:cNvPr>
-          <p:cNvSpPr txBox="1"/>
+          <p:cNvPicPr>
+            <a:picLocks noChangeAspect="1"/>
+          </p:cNvPicPr>
           <p:nvPr/>
-        </p:nvSpPr>
+        </p:nvPicPr>
+        <p:blipFill>
+          <a:blip r:embed="rId2"/>
+          <a:stretch>
+            <a:fillRect/>
+          </a:stretch>
+        </p:blipFill>
         <p:spPr>
           <a:xfrm>
-            <a:off x="1941921" y="2196851"/>
-            <a:ext cx="1158522" cy="523220"/>
+            <a:off x="5836795" y="1729661"/>
+            <a:ext cx="4464183" cy="1372043"/>
           </a:xfrm>
           <a:prstGeom prst="rect">
             <a:avLst/>
           </a:prstGeom>
-          <a:noFill/>
         </p:spPr>
-        <p:txBody>
-          <a:bodyPr wrap="none" rtlCol="0">
-            <a:spAutoFit/>
-          </a:bodyPr>
-          <a:lstStyle/>
-          <a:p>
-            <a:r>
-              <a:rPr lang="fr-FR" sz="2800" b="1" dirty="0"/>
-              <a:t>Trello</a:t>
-            </a:r>
-          </a:p>
-        </p:txBody>
-      </p:sp>
-      <p:sp>
-        <p:nvSpPr>
-          <p:cNvPr id="6" name="ZoneTexte 5">
+      </p:pic>
+      <p:pic>
+        <p:nvPicPr>
+          <p:cNvPr id="11" name="Image 10">
             <a:extLst>
               <a:ext uri="{FF2B5EF4-FFF2-40B4-BE49-F238E27FC236}">
-                <a16:creationId xmlns:a16="http://schemas.microsoft.com/office/drawing/2014/main" id="{5F980BE0-8FE4-4DBF-BF39-2F4D78A88010}"/>
+                <a16:creationId xmlns:a16="http://schemas.microsoft.com/office/drawing/2014/main" id="{2FC5C7BA-74CA-45EE-B4D6-E29632232534}"/>
               </a:ext>
             </a:extLst>
           </p:cNvPr>
-          <p:cNvSpPr txBox="1"/>
+          <p:cNvPicPr>
+            <a:picLocks noChangeAspect="1"/>
+          </p:cNvPicPr>
           <p:nvPr/>
-        </p:nvSpPr>
+        </p:nvPicPr>
+        <p:blipFill>
+          <a:blip r:embed="rId3"/>
+          <a:stretch>
+            <a:fillRect/>
+          </a:stretch>
+        </p:blipFill>
         <p:spPr>
           <a:xfrm>
-            <a:off x="1941921" y="2938710"/>
-            <a:ext cx="1067921" cy="523220"/>
+            <a:off x="2628448" y="3904302"/>
+            <a:ext cx="2573255" cy="1929941"/>
           </a:xfrm>
           <a:prstGeom prst="rect">
             <a:avLst/>
           </a:prstGeom>
-          <a:noFill/>
         </p:spPr>
-        <p:txBody>
-          <a:bodyPr wrap="none" rtlCol="0">
-            <a:spAutoFit/>
-          </a:bodyPr>
-          <a:lstStyle/>
-          <a:p>
-            <a:r>
-              <a:rPr lang="fr-FR" sz="2800" b="1" dirty="0"/>
-              <a:t>Slack</a:t>
-            </a:r>
-          </a:p>
-        </p:txBody>
-      </p:sp>
-      <p:sp>
-        <p:nvSpPr>
-          <p:cNvPr id="7" name="ZoneTexte 6">
+      </p:pic>
+      <p:pic>
+        <p:nvPicPr>
+          <p:cNvPr id="13" name="Image 12">
             <a:extLst>
               <a:ext uri="{FF2B5EF4-FFF2-40B4-BE49-F238E27FC236}">
-                <a16:creationId xmlns:a16="http://schemas.microsoft.com/office/drawing/2014/main" id="{D79087FF-A0F2-47DE-BD4C-F553167ECA0C}"/>
+                <a16:creationId xmlns:a16="http://schemas.microsoft.com/office/drawing/2014/main" id="{EC6C3936-078C-48DB-9D39-03A69E26E853}"/>
               </a:ext>
             </a:extLst>
           </p:cNvPr>
-          <p:cNvSpPr txBox="1"/>
+          <p:cNvPicPr>
+            <a:picLocks noChangeAspect="1"/>
+          </p:cNvPicPr>
           <p:nvPr/>
-        </p:nvSpPr>
+        </p:nvPicPr>
+        <p:blipFill>
+          <a:blip r:embed="rId4"/>
+          <a:stretch>
+            <a:fillRect/>
+          </a:stretch>
+        </p:blipFill>
         <p:spPr>
           <a:xfrm>
-            <a:off x="1896331" y="3680569"/>
-            <a:ext cx="2408223" cy="523220"/>
+            <a:off x="2804963" y="1329097"/>
+            <a:ext cx="2220227" cy="2220227"/>
           </a:xfrm>
           <a:prstGeom prst="rect">
             <a:avLst/>
           </a:prstGeom>
-          <a:noFill/>
         </p:spPr>
-        <p:txBody>
-          <a:bodyPr wrap="none" rtlCol="0">
-            <a:spAutoFit/>
-          </a:bodyPr>
-          <a:lstStyle/>
-          <a:p>
-            <a:r>
-              <a:rPr lang="fr-FR" sz="2800" b="1" dirty="0"/>
-              <a:t>Google Drive</a:t>
-            </a:r>
-          </a:p>
-        </p:txBody>
-      </p:sp>
-      <p:sp>
-        <p:nvSpPr>
-          <p:cNvPr id="8" name="ZoneTexte 7">
+      </p:pic>
+      <p:pic>
+        <p:nvPicPr>
+          <p:cNvPr id="15" name="Image 14">
             <a:extLst>
               <a:ext uri="{FF2B5EF4-FFF2-40B4-BE49-F238E27FC236}">
-                <a16:creationId xmlns:a16="http://schemas.microsoft.com/office/drawing/2014/main" id="{F434A071-5CEC-4538-BCFD-E16E13F82C10}"/>
+                <a16:creationId xmlns:a16="http://schemas.microsoft.com/office/drawing/2014/main" id="{7F9343F1-7CC4-4D32-ADD9-A6529E2C513E}"/>
               </a:ext>
             </a:extLst>
           </p:cNvPr>
-          <p:cNvSpPr txBox="1"/>
+          <p:cNvPicPr>
+            <a:picLocks noChangeAspect="1"/>
+          </p:cNvPicPr>
           <p:nvPr/>
-        </p:nvSpPr>
+        </p:nvPicPr>
+        <p:blipFill rotWithShape="1">
+          <a:blip r:embed="rId5"/>
+          <a:srcRect l="28629" t="14623" r="27849" b="13377"/>
+          <a:stretch/>
+        </p:blipFill>
         <p:spPr>
           <a:xfrm>
-            <a:off x="1896331" y="4422428"/>
-            <a:ext cx="1539204" cy="523220"/>
+            <a:off x="7231328" y="3444850"/>
+            <a:ext cx="2345560" cy="2587683"/>
           </a:xfrm>
           <a:prstGeom prst="rect">
             <a:avLst/>
           </a:prstGeom>
-          <a:noFill/>
         </p:spPr>
-        <p:txBody>
-          <a:bodyPr wrap="none" rtlCol="0">
-            <a:spAutoFit/>
-          </a:bodyPr>
-          <a:lstStyle/>
-          <a:p>
-            <a:r>
-              <a:rPr lang="fr-FR" sz="2800" b="1" dirty="0"/>
-              <a:t>Git Hub</a:t>
-            </a:r>
-          </a:p>
-        </p:txBody>
-      </p:sp>
+      </p:pic>
     </p:spTree>
     <p:extLst>
       <p:ext uri="{BB962C8B-B14F-4D97-AF65-F5344CB8AC3E}">

</xml_diff>